<commit_message>
updates before class 3
</commit_message>
<xml_diff>
--- a/lectures/2024_GNET749_Lecture3.pptx
+++ b/lectures/2024_GNET749_Lecture3.pptx
@@ -5,7 +5,7 @@
     <p:sldMasterId id="2147483648" r:id="rId1"/>
   </p:sldMasterIdLst>
   <p:notesMasterIdLst>
-    <p:notesMasterId r:id="rId27"/>
+    <p:notesMasterId r:id="rId28"/>
   </p:notesMasterIdLst>
   <p:sldIdLst>
     <p:sldId id="256" r:id="rId2"/>
@@ -32,7 +32,8 @@
     <p:sldId id="308" r:id="rId23"/>
     <p:sldId id="321" r:id="rId24"/>
     <p:sldId id="324" r:id="rId25"/>
-    <p:sldId id="303" r:id="rId26"/>
+    <p:sldId id="325" r:id="rId26"/>
+    <p:sldId id="303" r:id="rId27"/>
   </p:sldIdLst>
   <p:sldSz cx="12192000" cy="6858000"/>
   <p:notesSz cx="6858000" cy="9144000"/>
@@ -221,7 +222,7 @@
           <a:p>
             <a:fld id="{CED3B269-BCFD-3E4D-9867-060E5123D2F8}" type="datetimeFigureOut">
               <a:rPr lang="en-US" smtClean="0"/>
-              <a:t>4/18/24</a:t>
+              <a:t>4/19/24</a:t>
             </a:fld>
             <a:endParaRPr lang="en-US"/>
           </a:p>
@@ -716,7 +717,7 @@
           <a:p>
             <a:fld id="{C17BA9DE-A22B-9A47-BD58-93CE3EC6954C}" type="datetimeFigureOut">
               <a:rPr lang="en-US" smtClean="0"/>
-              <a:t>4/18/24</a:t>
+              <a:t>4/19/24</a:t>
             </a:fld>
             <a:endParaRPr lang="en-US"/>
           </a:p>
@@ -914,7 +915,7 @@
           <a:p>
             <a:fld id="{C17BA9DE-A22B-9A47-BD58-93CE3EC6954C}" type="datetimeFigureOut">
               <a:rPr lang="en-US" smtClean="0"/>
-              <a:t>4/18/24</a:t>
+              <a:t>4/19/24</a:t>
             </a:fld>
             <a:endParaRPr lang="en-US"/>
           </a:p>
@@ -1122,7 +1123,7 @@
           <a:p>
             <a:fld id="{C17BA9DE-A22B-9A47-BD58-93CE3EC6954C}" type="datetimeFigureOut">
               <a:rPr lang="en-US" smtClean="0"/>
-              <a:t>4/18/24</a:t>
+              <a:t>4/19/24</a:t>
             </a:fld>
             <a:endParaRPr lang="en-US"/>
           </a:p>
@@ -1320,7 +1321,7 @@
           <a:p>
             <a:fld id="{C17BA9DE-A22B-9A47-BD58-93CE3EC6954C}" type="datetimeFigureOut">
               <a:rPr lang="en-US" smtClean="0"/>
-              <a:t>4/18/24</a:t>
+              <a:t>4/19/24</a:t>
             </a:fld>
             <a:endParaRPr lang="en-US"/>
           </a:p>
@@ -1595,7 +1596,7 @@
           <a:p>
             <a:fld id="{C17BA9DE-A22B-9A47-BD58-93CE3EC6954C}" type="datetimeFigureOut">
               <a:rPr lang="en-US" smtClean="0"/>
-              <a:t>4/18/24</a:t>
+              <a:t>4/19/24</a:t>
             </a:fld>
             <a:endParaRPr lang="en-US"/>
           </a:p>
@@ -1860,7 +1861,7 @@
           <a:p>
             <a:fld id="{C17BA9DE-A22B-9A47-BD58-93CE3EC6954C}" type="datetimeFigureOut">
               <a:rPr lang="en-US" smtClean="0"/>
-              <a:t>4/18/24</a:t>
+              <a:t>4/19/24</a:t>
             </a:fld>
             <a:endParaRPr lang="en-US"/>
           </a:p>
@@ -2272,7 +2273,7 @@
           <a:p>
             <a:fld id="{C17BA9DE-A22B-9A47-BD58-93CE3EC6954C}" type="datetimeFigureOut">
               <a:rPr lang="en-US" smtClean="0"/>
-              <a:t>4/18/24</a:t>
+              <a:t>4/19/24</a:t>
             </a:fld>
             <a:endParaRPr lang="en-US"/>
           </a:p>
@@ -2413,7 +2414,7 @@
           <a:p>
             <a:fld id="{C17BA9DE-A22B-9A47-BD58-93CE3EC6954C}" type="datetimeFigureOut">
               <a:rPr lang="en-US" smtClean="0"/>
-              <a:t>4/18/24</a:t>
+              <a:t>4/19/24</a:t>
             </a:fld>
             <a:endParaRPr lang="en-US"/>
           </a:p>
@@ -2526,7 +2527,7 @@
           <a:p>
             <a:fld id="{C17BA9DE-A22B-9A47-BD58-93CE3EC6954C}" type="datetimeFigureOut">
               <a:rPr lang="en-US" smtClean="0"/>
-              <a:t>4/18/24</a:t>
+              <a:t>4/19/24</a:t>
             </a:fld>
             <a:endParaRPr lang="en-US"/>
           </a:p>
@@ -2837,7 +2838,7 @@
           <a:p>
             <a:fld id="{C17BA9DE-A22B-9A47-BD58-93CE3EC6954C}" type="datetimeFigureOut">
               <a:rPr lang="en-US" smtClean="0"/>
-              <a:t>4/18/24</a:t>
+              <a:t>4/19/24</a:t>
             </a:fld>
             <a:endParaRPr lang="en-US"/>
           </a:p>
@@ -3125,7 +3126,7 @@
           <a:p>
             <a:fld id="{C17BA9DE-A22B-9A47-BD58-93CE3EC6954C}" type="datetimeFigureOut">
               <a:rPr lang="en-US" smtClean="0"/>
-              <a:t>4/18/24</a:t>
+              <a:t>4/19/24</a:t>
             </a:fld>
             <a:endParaRPr lang="en-US"/>
           </a:p>
@@ -3366,7 +3367,7 @@
           <a:p>
             <a:fld id="{C17BA9DE-A22B-9A47-BD58-93CE3EC6954C}" type="datetimeFigureOut">
               <a:rPr lang="en-US" smtClean="0"/>
-              <a:t>4/18/24</a:t>
+              <a:t>4/19/24</a:t>
             </a:fld>
             <a:endParaRPr lang="en-US"/>
           </a:p>
@@ -4256,7 +4257,7 @@
           </a:ln>
           <a:extLst>
             <a:ext uri="{C572A759-6A51-4108-AA02-DFA0A04FC94B}">
-              <ma14:wrappingTextBoxFlag xmlns="" xmlns:m="http://schemas.openxmlformats.org/officeDocument/2006/math" xmlns:a14="http://schemas.microsoft.com/office/drawing/2010/main" xmlns:ma14="http://schemas.microsoft.com/office/mac/drawingml/2011/main" val="1"/>
+              <ma14:wrappingTextBoxFlag xmlns:ma14="http://schemas.microsoft.com/office/mac/drawingml/2011/main" xmlns:a14="http://schemas.microsoft.com/office/drawing/2010/main" xmlns:m="http://schemas.openxmlformats.org/officeDocument/2006/math" xmlns="" val="1"/>
             </a:ext>
           </a:extLst>
         </p:spPr>
@@ -4301,7 +4302,7 @@
           </a:ln>
           <a:extLst>
             <a:ext uri="{C572A759-6A51-4108-AA02-DFA0A04FC94B}">
-              <ma14:wrappingTextBoxFlag xmlns="" xmlns:m="http://schemas.openxmlformats.org/officeDocument/2006/math" xmlns:a14="http://schemas.microsoft.com/office/drawing/2010/main" xmlns:ma14="http://schemas.microsoft.com/office/mac/drawingml/2011/main" val="1"/>
+              <ma14:wrappingTextBoxFlag xmlns:ma14="http://schemas.microsoft.com/office/mac/drawingml/2011/main" xmlns:a14="http://schemas.microsoft.com/office/drawing/2010/main" xmlns:m="http://schemas.openxmlformats.org/officeDocument/2006/math" xmlns="" val="1"/>
             </a:ext>
           </a:extLst>
         </p:spPr>
@@ -4342,7 +4343,7 @@
           </a:ln>
           <a:extLst>
             <a:ext uri="{C572A759-6A51-4108-AA02-DFA0A04FC94B}">
-              <ma14:wrappingTextBoxFlag xmlns="" xmlns:m="http://schemas.openxmlformats.org/officeDocument/2006/math" xmlns:a14="http://schemas.microsoft.com/office/drawing/2010/main" xmlns:ma14="http://schemas.microsoft.com/office/mac/drawingml/2011/main" val="1"/>
+              <ma14:wrappingTextBoxFlag xmlns:ma14="http://schemas.microsoft.com/office/mac/drawingml/2011/main" xmlns:a14="http://schemas.microsoft.com/office/drawing/2010/main" xmlns:m="http://schemas.openxmlformats.org/officeDocument/2006/math" xmlns="" val="1"/>
             </a:ext>
           </a:extLst>
         </p:spPr>
@@ -4402,7 +4403,7 @@
           </a:ln>
           <a:extLst>
             <a:ext uri="{C572A759-6A51-4108-AA02-DFA0A04FC94B}">
-              <ma14:wrappingTextBoxFlag xmlns="" xmlns:m="http://schemas.openxmlformats.org/officeDocument/2006/math" xmlns:a14="http://schemas.microsoft.com/office/drawing/2010/main" xmlns:ma14="http://schemas.microsoft.com/office/mac/drawingml/2011/main" val="1"/>
+              <ma14:wrappingTextBoxFlag xmlns:ma14="http://schemas.microsoft.com/office/mac/drawingml/2011/main" xmlns:a14="http://schemas.microsoft.com/office/drawing/2010/main" xmlns:m="http://schemas.openxmlformats.org/officeDocument/2006/math" xmlns="" val="1"/>
             </a:ext>
           </a:extLst>
         </p:spPr>
@@ -4477,7 +4478,7 @@
           </a:ln>
           <a:extLst>
             <a:ext uri="{C572A759-6A51-4108-AA02-DFA0A04FC94B}">
-              <ma14:wrappingTextBoxFlag xmlns:ma14="http://schemas.microsoft.com/office/mac/drawingml/2011/main" xmlns:a14="http://schemas.microsoft.com/office/drawing/2010/main" xmlns:m="http://schemas.openxmlformats.org/officeDocument/2006/math" xmlns="" val="1"/>
+              <ma14:wrappingTextBoxFlag xmlns="" xmlns:m="http://schemas.openxmlformats.org/officeDocument/2006/math" xmlns:a14="http://schemas.microsoft.com/office/drawing/2010/main" xmlns:ma14="http://schemas.microsoft.com/office/mac/drawingml/2011/main" val="1"/>
             </a:ext>
           </a:extLst>
         </p:spPr>
@@ -4522,7 +4523,7 @@
           </a:ln>
           <a:extLst>
             <a:ext uri="{C572A759-6A51-4108-AA02-DFA0A04FC94B}">
-              <ma14:wrappingTextBoxFlag xmlns:ma14="http://schemas.microsoft.com/office/mac/drawingml/2011/main" xmlns:a14="http://schemas.microsoft.com/office/drawing/2010/main" xmlns:m="http://schemas.openxmlformats.org/officeDocument/2006/math" xmlns="" val="1"/>
+              <ma14:wrappingTextBoxFlag xmlns="" xmlns:m="http://schemas.openxmlformats.org/officeDocument/2006/math" xmlns:a14="http://schemas.microsoft.com/office/drawing/2010/main" xmlns:ma14="http://schemas.microsoft.com/office/mac/drawingml/2011/main" val="1"/>
             </a:ext>
           </a:extLst>
         </p:spPr>
@@ -4709,7 +4710,7 @@
           </a:ln>
           <a:extLst>
             <a:ext uri="{C572A759-6A51-4108-AA02-DFA0A04FC94B}">
-              <ma14:wrappingTextBoxFlag xmlns:ma14="http://schemas.microsoft.com/office/mac/drawingml/2011/main" xmlns:a14="http://schemas.microsoft.com/office/drawing/2010/main" xmlns:m="http://schemas.openxmlformats.org/officeDocument/2006/math" xmlns="" val="1"/>
+              <ma14:wrappingTextBoxFlag xmlns="" xmlns:m="http://schemas.openxmlformats.org/officeDocument/2006/math" xmlns:a14="http://schemas.microsoft.com/office/drawing/2010/main" xmlns:ma14="http://schemas.microsoft.com/office/mac/drawingml/2011/main" val="1"/>
             </a:ext>
           </a:extLst>
         </p:spPr>
@@ -4750,7 +4751,7 @@
           </a:ln>
           <a:extLst>
             <a:ext uri="{C572A759-6A51-4108-AA02-DFA0A04FC94B}">
-              <ma14:wrappingTextBoxFlag xmlns:ma14="http://schemas.microsoft.com/office/mac/drawingml/2011/main" xmlns:a14="http://schemas.microsoft.com/office/drawing/2010/main" xmlns:m="http://schemas.openxmlformats.org/officeDocument/2006/math" xmlns="" val="1"/>
+              <ma14:wrappingTextBoxFlag xmlns="" xmlns:m="http://schemas.openxmlformats.org/officeDocument/2006/math" xmlns:a14="http://schemas.microsoft.com/office/drawing/2010/main" xmlns:ma14="http://schemas.microsoft.com/office/mac/drawingml/2011/main" val="1"/>
             </a:ext>
           </a:extLst>
         </p:spPr>
@@ -4800,7 +4801,7 @@
           </a:ln>
           <a:extLst>
             <a:ext uri="{C572A759-6A51-4108-AA02-DFA0A04FC94B}">
-              <ma14:wrappingTextBoxFlag xmlns:ma14="http://schemas.microsoft.com/office/mac/drawingml/2011/main" xmlns:a14="http://schemas.microsoft.com/office/drawing/2010/main" xmlns:m="http://schemas.openxmlformats.org/officeDocument/2006/math" xmlns="" val="1"/>
+              <ma14:wrappingTextBoxFlag xmlns="" xmlns:m="http://schemas.openxmlformats.org/officeDocument/2006/math" xmlns:a14="http://schemas.microsoft.com/office/drawing/2010/main" xmlns:ma14="http://schemas.microsoft.com/office/mac/drawingml/2011/main" val="1"/>
             </a:ext>
           </a:extLst>
         </p:spPr>
@@ -4860,7 +4861,7 @@
           </a:ln>
           <a:extLst>
             <a:ext uri="{C572A759-6A51-4108-AA02-DFA0A04FC94B}">
-              <ma14:wrappingTextBoxFlag xmlns:ma14="http://schemas.microsoft.com/office/mac/drawingml/2011/main" xmlns:a14="http://schemas.microsoft.com/office/drawing/2010/main" xmlns:m="http://schemas.openxmlformats.org/officeDocument/2006/math" xmlns="" val="1"/>
+              <ma14:wrappingTextBoxFlag xmlns="" xmlns:m="http://schemas.openxmlformats.org/officeDocument/2006/math" xmlns:a14="http://schemas.microsoft.com/office/drawing/2010/main" xmlns:ma14="http://schemas.microsoft.com/office/mac/drawingml/2011/main" val="1"/>
             </a:ext>
           </a:extLst>
         </p:spPr>
@@ -6797,7 +6798,7 @@
           </a:ln>
           <a:extLst>
             <a:ext uri="{C572A759-6A51-4108-AA02-DFA0A04FC94B}">
-              <ma14:wrappingTextBoxFlag xmlns:ma14="http://schemas.microsoft.com/office/mac/drawingml/2011/main" xmlns:a14="http://schemas.microsoft.com/office/drawing/2010/main" xmlns:m="http://schemas.openxmlformats.org/officeDocument/2006/math" xmlns="" val="1"/>
+              <ma14:wrappingTextBoxFlag xmlns="" xmlns:m="http://schemas.openxmlformats.org/officeDocument/2006/math" xmlns:a14="http://schemas.microsoft.com/office/drawing/2010/main" xmlns:ma14="http://schemas.microsoft.com/office/mac/drawingml/2011/main" val="1"/>
             </a:ext>
           </a:extLst>
         </p:spPr>
@@ -6833,7 +6834,7 @@
           </a:ln>
           <a:extLst>
             <a:ext uri="{C572A759-6A51-4108-AA02-DFA0A04FC94B}">
-              <ma14:wrappingTextBoxFlag xmlns:ma14="http://schemas.microsoft.com/office/mac/drawingml/2011/main" xmlns:a14="http://schemas.microsoft.com/office/drawing/2010/main" xmlns:m="http://schemas.openxmlformats.org/officeDocument/2006/math" xmlns="" val="1"/>
+              <ma14:wrappingTextBoxFlag xmlns="" xmlns:m="http://schemas.openxmlformats.org/officeDocument/2006/math" xmlns:a14="http://schemas.microsoft.com/office/drawing/2010/main" xmlns:ma14="http://schemas.microsoft.com/office/mac/drawingml/2011/main" val="1"/>
             </a:ext>
           </a:extLst>
         </p:spPr>
@@ -6907,7 +6908,7 @@
           </a:ln>
           <a:extLst>
             <a:ext uri="{C572A759-6A51-4108-AA02-DFA0A04FC94B}">
-              <ma14:wrappingTextBoxFlag xmlns:ma14="http://schemas.microsoft.com/office/mac/drawingml/2011/main" xmlns:a14="http://schemas.microsoft.com/office/drawing/2010/main" xmlns:m="http://schemas.openxmlformats.org/officeDocument/2006/math" xmlns="" val="1"/>
+              <ma14:wrappingTextBoxFlag xmlns="" xmlns:m="http://schemas.openxmlformats.org/officeDocument/2006/math" xmlns:a14="http://schemas.microsoft.com/office/drawing/2010/main" xmlns:ma14="http://schemas.microsoft.com/office/mac/drawingml/2011/main" val="1"/>
             </a:ext>
           </a:extLst>
         </p:spPr>
@@ -6997,7 +6998,7 @@
           </a:ln>
           <a:extLst>
             <a:ext uri="{C572A759-6A51-4108-AA02-DFA0A04FC94B}">
-              <ma14:wrappingTextBoxFlag xmlns:ma14="http://schemas.microsoft.com/office/mac/drawingml/2011/main" xmlns:a14="http://schemas.microsoft.com/office/drawing/2010/main" xmlns:m="http://schemas.openxmlformats.org/officeDocument/2006/math" xmlns="" val="1"/>
+              <ma14:wrappingTextBoxFlag xmlns="" xmlns:m="http://schemas.openxmlformats.org/officeDocument/2006/math" xmlns:a14="http://schemas.microsoft.com/office/drawing/2010/main" xmlns:ma14="http://schemas.microsoft.com/office/mac/drawingml/2011/main" val="1"/>
             </a:ext>
           </a:extLst>
         </p:spPr>
@@ -7094,7 +7095,7 @@
             <a:effectLst/>
             <a:extLst>
               <a:ext uri="{C572A759-6A51-4108-AA02-DFA0A04FC94B}">
-                <ma14:wrappingTextBoxFlag xmlns:ma14="http://schemas.microsoft.com/office/mac/drawingml/2011/main" xmlns:a14="http://schemas.microsoft.com/office/drawing/2010/main" xmlns:m="http://schemas.openxmlformats.org/officeDocument/2006/math" xmlns="" val="1"/>
+                <ma14:wrappingTextBoxFlag xmlns="" xmlns:m="http://schemas.openxmlformats.org/officeDocument/2006/math" xmlns:a14="http://schemas.microsoft.com/office/drawing/2010/main" xmlns:ma14="http://schemas.microsoft.com/office/mac/drawingml/2011/main" val="1"/>
               </a:ext>
             </a:extLst>
           </p:spPr>
@@ -7973,6 +7974,256 @@
 </file>
 
 <file path=ppt/slides/slide25.xml><?xml version="1.0" encoding="utf-8"?>
+<p:sld xmlns:a="http://schemas.openxmlformats.org/drawingml/2006/main" xmlns:r="http://schemas.openxmlformats.org/officeDocument/2006/relationships" xmlns:p="http://schemas.openxmlformats.org/presentationml/2006/main">
+  <p:cSld>
+    <p:spTree>
+      <p:nvGrpSpPr>
+        <p:cNvPr id="1" name=""/>
+        <p:cNvGrpSpPr/>
+        <p:nvPr/>
+      </p:nvGrpSpPr>
+      <p:grpSpPr>
+        <a:xfrm>
+          <a:off x="0" y="0"/>
+          <a:ext cx="0" cy="0"/>
+          <a:chOff x="0" y="0"/>
+          <a:chExt cx="0" cy="0"/>
+        </a:xfrm>
+      </p:grpSpPr>
+      <p:sp>
+        <p:nvSpPr>
+          <p:cNvPr id="2" name="TextBox 1">
+            <a:extLst>
+              <a:ext uri="{FF2B5EF4-FFF2-40B4-BE49-F238E27FC236}">
+                <a16:creationId xmlns:a16="http://schemas.microsoft.com/office/drawing/2014/main" id="{36ECFDD4-6D6E-A85B-5BF1-3E46D508D3FC}"/>
+              </a:ext>
+            </a:extLst>
+          </p:cNvPr>
+          <p:cNvSpPr txBox="1"/>
+          <p:nvPr/>
+        </p:nvSpPr>
+        <p:spPr>
+          <a:xfrm>
+            <a:off x="3282594" y="297950"/>
+            <a:ext cx="5856269" cy="369332"/>
+          </a:xfrm>
+          <a:prstGeom prst="rect">
+            <a:avLst/>
+          </a:prstGeom>
+          <a:noFill/>
+        </p:spPr>
+        <p:txBody>
+          <a:bodyPr wrap="square" rtlCol="0">
+            <a:spAutoFit/>
+          </a:bodyPr>
+          <a:lstStyle/>
+          <a:p>
+            <a:r>
+              <a:rPr lang="en-US" dirty="0"/>
+              <a:t>R Crash Course – what you need to (should) know</a:t>
+            </a:r>
+          </a:p>
+        </p:txBody>
+      </p:sp>
+      <p:sp>
+        <p:nvSpPr>
+          <p:cNvPr id="3" name="TextBox 2">
+            <a:extLst>
+              <a:ext uri="{FF2B5EF4-FFF2-40B4-BE49-F238E27FC236}">
+                <a16:creationId xmlns:a16="http://schemas.microsoft.com/office/drawing/2014/main" id="{ED5E61C4-629E-16C4-0EF8-ED198C66467C}"/>
+              </a:ext>
+            </a:extLst>
+          </p:cNvPr>
+          <p:cNvSpPr txBox="1"/>
+          <p:nvPr/>
+        </p:nvSpPr>
+        <p:spPr>
+          <a:xfrm>
+            <a:off x="2178121" y="1469205"/>
+            <a:ext cx="8065214" cy="2585323"/>
+          </a:xfrm>
+          <a:prstGeom prst="rect">
+            <a:avLst/>
+          </a:prstGeom>
+          <a:noFill/>
+        </p:spPr>
+        <p:txBody>
+          <a:bodyPr wrap="square" rtlCol="0">
+            <a:spAutoFit/>
+          </a:bodyPr>
+          <a:lstStyle/>
+          <a:p>
+            <a:pPr marL="342900" indent="-342900">
+              <a:buAutoNum type="arabicPeriod"/>
+            </a:pPr>
+            <a:r>
+              <a:rPr lang="en-US" dirty="0"/>
+              <a:t>Basic data structures – vector, </a:t>
+            </a:r>
+            <a:r>
+              <a:rPr lang="en-US" dirty="0" err="1"/>
+              <a:t>data.frame</a:t>
+            </a:r>
+            <a:r>
+              <a:rPr lang="en-US" dirty="0"/>
+              <a:t>, matrix, </a:t>
+            </a:r>
+            <a:r>
+              <a:rPr lang="en-US" dirty="0" err="1"/>
+              <a:t>summarizedExperiment</a:t>
+            </a:r>
+            <a:endParaRPr lang="en-US" dirty="0"/>
+          </a:p>
+          <a:p>
+            <a:pPr marL="342900" indent="-342900">
+              <a:buAutoNum type="arabicPeriod"/>
+            </a:pPr>
+            <a:r>
+              <a:rPr lang="en-US" dirty="0"/>
+              <a:t>How to get data into R (</a:t>
+            </a:r>
+            <a:r>
+              <a:rPr lang="en-US" dirty="0" err="1"/>
+              <a:t>read_csv</a:t>
+            </a:r>
+            <a:r>
+              <a:rPr lang="en-US" dirty="0"/>
+              <a:t>)</a:t>
+            </a:r>
+          </a:p>
+          <a:p>
+            <a:pPr marL="342900" indent="-342900">
+              <a:buAutoNum type="arabicPeriod"/>
+            </a:pPr>
+            <a:r>
+              <a:rPr lang="en-US" dirty="0"/>
+              <a:t>How to use </a:t>
+            </a:r>
+            <a:r>
+              <a:rPr lang="en-US" dirty="0" err="1"/>
+              <a:t>tidyverse</a:t>
+            </a:r>
+            <a:r>
+              <a:rPr lang="en-US" dirty="0"/>
+              <a:t> to manipulate and explore data</a:t>
+            </a:r>
+          </a:p>
+          <a:p>
+            <a:pPr marL="800100" lvl="1" indent="-342900">
+              <a:buAutoNum type="arabicPeriod"/>
+            </a:pPr>
+            <a:r>
+              <a:rPr lang="en-US" dirty="0"/>
+              <a:t>filter() </a:t>
+            </a:r>
+            <a:r>
+              <a:rPr lang="en-US" dirty="0" err="1"/>
+              <a:t>group_by</a:t>
+            </a:r>
+            <a:r>
+              <a:rPr lang="en-US" dirty="0"/>
+              <a:t>() mutate() </a:t>
+            </a:r>
+            <a:r>
+              <a:rPr lang="en-US" dirty="0" err="1"/>
+              <a:t>summarise</a:t>
+            </a:r>
+            <a:r>
+              <a:rPr lang="en-US" dirty="0"/>
+              <a:t>()</a:t>
+            </a:r>
+          </a:p>
+          <a:p>
+            <a:pPr marL="342900" indent="-342900">
+              <a:buAutoNum type="arabicPeriod"/>
+            </a:pPr>
+            <a:r>
+              <a:rPr lang="en-US" dirty="0"/>
+              <a:t>How to plot data </a:t>
+            </a:r>
+          </a:p>
+          <a:p>
+            <a:pPr marL="800100" lvl="1" indent="-342900">
+              <a:buAutoNum type="arabicPeriod"/>
+            </a:pPr>
+            <a:r>
+              <a:rPr lang="en-US" dirty="0" err="1"/>
+              <a:t>ggplot</a:t>
+            </a:r>
+            <a:r>
+              <a:rPr lang="en-US" dirty="0"/>
+              <a:t>(data, </a:t>
+            </a:r>
+            <a:r>
+              <a:rPr lang="en-US" dirty="0" err="1"/>
+              <a:t>aes</a:t>
+            </a:r>
+            <a:r>
+              <a:rPr lang="en-US" dirty="0"/>
+              <a:t>(x = , y =, color = , fill = , shape = ) ) +</a:t>
+            </a:r>
+          </a:p>
+          <a:p>
+            <a:pPr lvl="1"/>
+            <a:r>
+              <a:rPr lang="en-US" dirty="0"/>
+              <a:t>	</a:t>
+            </a:r>
+            <a:r>
+              <a:rPr lang="en-US" dirty="0" err="1"/>
+              <a:t>geom_point</a:t>
+            </a:r>
+            <a:r>
+              <a:rPr lang="en-US" dirty="0"/>
+              <a:t>() + </a:t>
+            </a:r>
+            <a:r>
+              <a:rPr lang="en-US" dirty="0" err="1"/>
+              <a:t>geom_boxplot</a:t>
+            </a:r>
+            <a:r>
+              <a:rPr lang="en-US" dirty="0"/>
+              <a:t>() + </a:t>
+            </a:r>
+            <a:r>
+              <a:rPr lang="en-US" dirty="0" err="1"/>
+              <a:t>geom_col</a:t>
+            </a:r>
+            <a:r>
+              <a:rPr lang="en-US" dirty="0"/>
+              <a:t>()</a:t>
+            </a:r>
+          </a:p>
+          <a:p>
+            <a:pPr lvl="1"/>
+            <a:r>
+              <a:rPr lang="en-US" dirty="0"/>
+              <a:t>			</a:t>
+            </a:r>
+          </a:p>
+          <a:p>
+            <a:pPr lvl="1"/>
+            <a:r>
+              <a:rPr lang="en-US" dirty="0"/>
+              <a:t>What is a function – why might you make your own	</a:t>
+            </a:r>
+          </a:p>
+        </p:txBody>
+      </p:sp>
+    </p:spTree>
+    <p:extLst>
+      <p:ext uri="{BB962C8B-B14F-4D97-AF65-F5344CB8AC3E}">
+        <p14:creationId xmlns:p14="http://schemas.microsoft.com/office/powerpoint/2010/main" val="1452045188"/>
+      </p:ext>
+    </p:extLst>
+  </p:cSld>
+  <p:clrMapOvr>
+    <a:masterClrMapping/>
+  </p:clrMapOvr>
+</p:sld>
+</file>
+
+<file path=ppt/slides/slide26.xml><?xml version="1.0" encoding="utf-8"?>
 <p:sld xmlns:a="http://schemas.openxmlformats.org/drawingml/2006/main" xmlns:r="http://schemas.openxmlformats.org/officeDocument/2006/relationships" xmlns:p="http://schemas.openxmlformats.org/presentationml/2006/main">
   <p:cSld>
     <p:spTree>

</xml_diff>